<commit_message>
update workshop w/ github
</commit_message>
<xml_diff>
--- a/JSON-B-workshop-CGI-widescreen.pptx
+++ b/JSON-B-workshop-CGI-widescreen.pptx
@@ -122,7 +122,7 @@
   </p:defaultTextStyle>
   <p:extLst>
     <p:ext uri="{EFAFB233-063F-42B5-8137-9DF3F51BA10A}">
-      <p15:sldGuideLst xmlns:p15="http://schemas.microsoft.com/office/powerpoint/2012/main" xmlns="">
+      <p15:sldGuideLst xmlns="" xmlns:p15="http://schemas.microsoft.com/office/powerpoint/2012/main">
         <p15:guide id="1" orient="horz" pos="835" userDrawn="1">
           <p15:clr>
             <a:srgbClr val="A4A3A4"/>
@@ -186,7 +186,7 @@
       </p15:sldGuideLst>
     </p:ext>
     <p:ext uri="{2D200454-40CA-4A62-9FC3-DE9A4176ACB9}">
-      <p15:notesGuideLst xmlns:p15="http://schemas.microsoft.com/office/powerpoint/2012/main" xmlns="">
+      <p15:notesGuideLst xmlns="" xmlns:p15="http://schemas.microsoft.com/office/powerpoint/2012/main">
         <p15:guide id="1" orient="horz" pos="2880">
           <p15:clr>
             <a:srgbClr val="A4A3A4"/>
@@ -290,7 +290,7 @@
                 <a:latin typeface="Arial" pitchFamily="34" charset="0"/>
               </a:rPr>
               <a:pPr/>
-              <a:t>01/09/2017</a:t>
+              <a:t>05/09/2017</a:t>
             </a:fld>
             <a:endParaRPr lang="en-GB" dirty="0">
               <a:latin typeface="Arial" pitchFamily="34" charset="0"/>
@@ -469,7 +469,7 @@
             <a:fld id="{B5D7A87D-1CDA-443F-BAE3-82C9C05446C3}" type="datetimeFigureOut">
               <a:rPr lang="en-GB" smtClean="0"/>
               <a:pPr/>
-              <a:t>01/09/2017</a:t>
+              <a:t>05/09/2017</a:t>
             </a:fld>
             <a:endParaRPr lang="en-GB" dirty="0"/>
           </a:p>
@@ -8987,14 +8987,12 @@
               <a:rPr lang="en-GB" dirty="0" smtClean="0"/>
               <a:t>Koos Drost</a:t>
             </a:r>
-            <a:endParaRPr lang="en-GB" dirty="0" smtClean="0"/>
           </a:p>
           <a:p>
             <a:r>
               <a:rPr lang="en-GB" dirty="0" smtClean="0"/>
               <a:t>05-09-2017</a:t>
             </a:r>
-            <a:endParaRPr lang="en-GB" dirty="0" smtClean="0"/>
           </a:p>
           <a:p>
             <a:endParaRPr lang="en-US" dirty="0" smtClean="0"/>
@@ -9817,25 +9815,8 @@
                   </a:schemeClr>
                 </a:solidFill>
               </a:rPr>
-              <a:t>annotations</a:t>
-            </a:r>
-            <a:r>
-              <a:rPr lang="en-US" sz="2800" dirty="0" smtClean="0">
-                <a:solidFill>
-                  <a:schemeClr val="accent1">
-                    <a:lumMod val="75000"/>
-                  </a:schemeClr>
-                </a:solidFill>
-              </a:rPr>
-              <a:t>”</a:t>
-            </a:r>
-            <a:endParaRPr lang="en-US" sz="2800" dirty="0" smtClean="0">
-              <a:solidFill>
-                <a:schemeClr val="accent1">
-                  <a:lumMod val="75000"/>
-                </a:schemeClr>
-              </a:solidFill>
-            </a:endParaRPr>
+              <a:t>annotations”</a:t>
+            </a:r>
           </a:p>
         </p:txBody>
       </p:sp>
@@ -10197,7 +10178,33 @@
           <a:p>
             <a:r>
               <a:rPr lang="nl-NL" b="1" dirty="0"/>
-              <a:t>Lab 1 </a:t>
+              <a:t>Lab </a:t>
+            </a:r>
+            <a:r>
+              <a:rPr lang="nl-NL" b="1"/>
+              <a:t>1 </a:t>
+            </a:r>
+            <a:r>
+              <a:rPr lang="nl-NL" b="1">
+                <a:hlinkClick r:id="rId2"/>
+              </a:rPr>
+              <a:t>https</a:t>
+            </a:r>
+            <a:r>
+              <a:rPr lang="nl-NL" b="1">
+                <a:hlinkClick r:id="rId2"/>
+              </a:rPr>
+              <a:t>://</a:t>
+            </a:r>
+            <a:r>
+              <a:rPr lang="nl-NL" b="1" smtClean="0">
+                <a:hlinkClick r:id="rId2"/>
+              </a:rPr>
+              <a:t>github.com/koosdrost/workshop</a:t>
+            </a:r>
+            <a:r>
+              <a:rPr lang="nl-NL" b="1" smtClean="0"/>
+              <a:t> </a:t>
             </a:r>
             <a:endParaRPr lang="nl-NL" b="1" dirty="0" smtClean="0"/>
           </a:p>
@@ -16380,6 +16387,69 @@
 </file>
 
 <file path=customXml/item1.xml><?xml version="1.0" encoding="utf-8"?>
+<p:properties xmlns:p="http://schemas.microsoft.com/office/2006/metadata/properties" xmlns:xsi="http://www.w3.org/2001/XMLSchema-instance">
+  <documentManagement>
+    <c5aebc35b3e840e5912c276ffe755dcf xmlns="d95a5b16-1b8d-4c7c-9ebf-89c0983b6970">
+      <Terms xmlns="http://schemas.microsoft.com/office/infopath/2007/PartnerControls"/>
+    </c5aebc35b3e840e5912c276ffe755dcf>
+    <c79d12643ffc4d60ab657aaa1718cc32 xmlns="d95a5b16-1b8d-4c7c-9ebf-89c0983b6970">
+      <Terms xmlns="http://schemas.microsoft.com/office/infopath/2007/PartnerControls">
+        <TermInfo xmlns="http://schemas.microsoft.com/office/infopath/2007/PartnerControls">
+          <TermName xmlns="http://schemas.microsoft.com/office/infopath/2007/PartnerControls">Global</TermName>
+          <TermId xmlns="http://schemas.microsoft.com/office/infopath/2007/PartnerControls">43ac7042-3752-4f1b-8a93-43b36e65d3e5</TermId>
+        </TermInfo>
+      </Terms>
+    </c79d12643ffc4d60ab657aaa1718cc32>
+    <p43f7bb208e443c9b50eb304fe6606a3 xmlns="d95a5b16-1b8d-4c7c-9ebf-89c0983b6970">
+      <Terms xmlns="http://schemas.microsoft.com/office/infopath/2007/PartnerControls"/>
+    </p43f7bb208e443c9b50eb304fe6606a3>
+    <TaxCatchAll xmlns="d95a5b16-1b8d-4c7c-9ebf-89c0983b6970">
+      <Value>260</Value>
+    </TaxCatchAll>
+    <h4c66fbf292e4125b0e390af25f11c04 xmlns="d95a5b16-1b8d-4c7c-9ebf-89c0983b6970">
+      <Terms xmlns="http://schemas.microsoft.com/office/infopath/2007/PartnerControls"/>
+    </h4c66fbf292e4125b0e390af25f11c04>
+    <eafb632c3f5c40ba98242be6bbd6bb17 xmlns="d95a5b16-1b8d-4c7c-9ebf-89c0983b6970">
+      <Terms xmlns="http://schemas.microsoft.com/office/infopath/2007/PartnerControls"/>
+    </eafb632c3f5c40ba98242be6bbd6bb17>
+    <Creator xmlns="d95a5b16-1b8d-4c7c-9ebf-89c0983b6970" xsi:nil="true"/>
+    <Language xmlns="http://schemas.microsoft.com/sharepoint/v3">EN</Language>
+    <CSMeta2010Field xmlns="http://schemas.microsoft.com/sharepoint/v3">b976f27d-4168-4ec3-9a20-c9b3ef3f986f;2017-08-30 20:22:02;AUTOCLASSIFIED;Business theme:2017-08-30 20:22:02|True||AUTOCLASSIFIED|2017-08-30 20:22:02|UNDEFINED|943f7bb2-08e4-43c9-b50e-b304fe6606a3;Organization:2017-08-30 20:22:02|False||AUTOCLASSIFIED|2017-08-30 20:22:02|UNDEFINED|c79d1264-3ffc-4d60-ab65-7aaa1718cc32;Sector:2017-08-30 20:22:02|True||AUTOCLASSIFIED|2017-08-30 20:22:02|UNDEFINED|c5aebc35-b3e8-40e5-912c-276ffe755dcf;Proposition:2017-08-30 20:22:02|True||AUTOCLASSIFIED|2017-08-30 20:22:02|UNDEFINED|14c66fbf-292e-4125-b0e3-90af25f11c04;Service line:2017-08-30 20:22:02|True||AUTOCLASSIFIED|2017-08-30 20:22:02|UNDEFINED|eafb632c-3f5c-40ba-9824-2be6bbd6bb17;Business Practice:2017-08-30 20:22:02|True||AUTOCLASSIFIED|2017-08-30 20:22:02|UNDEFINED|b0f7c43c-b32a-4bb9-9696-cc0157e407bc;False</CSMeta2010Field>
+    <b0f7c43cb32a4bb99696cc0157e407bc xmlns="d95a5b16-1b8d-4c7c-9ebf-89c0983b6970">
+      <Terms xmlns="http://schemas.microsoft.com/office/infopath/2007/PartnerControls"/>
+    </b0f7c43cb32a4bb99696cc0157e407bc>
+    <Abstract xmlns="d95a5b16-1b8d-4c7c-9ebf-89c0983b6970">CGI-beet-option_widescreen_EN</Abstract>
+    <External_x0020_Use xmlns="d95a5b16-1b8d-4c7c-9ebf-89c0983b6970">No</External_x0020_Use>
+    <Owner_x0020_Organisation xmlns="d95a5b16-1b8d-4c7c-9ebf-89c0983b6970">Group</Owner_x0020_Organisation>
+    <BS_x0020_Document_x0020_Sub_x0020_Type xmlns="d95a5b16-1b8d-4c7c-9ebf-89c0983b6970">Pro Forma</BS_x0020_Document_x0020_Sub_x0020_Type>
+    <Market xmlns="d95a5b16-1b8d-4c7c-9ebf-89c0983b6970"/>
+    <TaxKeywordTaxHTField xmlns="d95a5b16-1b8d-4c7c-9ebf-89c0983b6970">
+      <Terms xmlns="http://schemas.microsoft.com/office/infopath/2007/PartnerControls"/>
+    </TaxKeywordTaxHTField>
+    <Best_x0020_Before_x0020_Date xmlns="d95a5b16-1b8d-4c7c-9ebf-89c0983b6970">2020-09-28T23:00:00+00:00</Best_x0020_Before_x0020_Date>
+    <Published_x0020_By xmlns="d95a5b16-1b8d-4c7c-9ebf-89c0983b6970">
+      <UserInfo>
+        <DisplayName>Stiller, Regina C</DisplayName>
+        <AccountId>55167</AccountId>
+        <AccountType/>
+      </UserInfo>
+    </Published_x0020_By>
+    <Publication_x0020_Date xmlns="d95a5b16-1b8d-4c7c-9ebf-89c0983b6970">2015-09-28T23:00:00+00:00</Publication_x0020_Date>
+    <Geographic_x0020_Region xmlns="d95a5b16-1b8d-4c7c-9ebf-89c0983b6970"/>
+  </documentManagement>
+</p:properties>
+</file>
+
+<file path=customXml/item2.xml><?xml version="1.0" encoding="utf-8"?>
+<?mso-contentType ?>
+<FormTemplates xmlns="http://schemas.microsoft.com/sharepoint/v3/contenttype/forms">
+  <Display>DocumentLibraryForm</Display>
+  <Edit>DocumentLibraryForm</Edit>
+  <New>DocumentLibraryForm</New>
+</FormTemplates>
+</file>
+
+<file path=customXml/item3.xml><?xml version="1.0" encoding="utf-8"?>
 <?mso-contentType ?>
 <spe:Receivers xmlns:spe="http://schemas.microsoft.com/sharepoint/events">
   <Receiver>
@@ -16513,69 +16583,6 @@
     <Filter/>
   </Receiver>
 </spe:Receivers>
-</file>
-
-<file path=customXml/item2.xml><?xml version="1.0" encoding="utf-8"?>
-<?mso-contentType ?>
-<FormTemplates xmlns="http://schemas.microsoft.com/sharepoint/v3/contenttype/forms">
-  <Display>DocumentLibraryForm</Display>
-  <Edit>DocumentLibraryForm</Edit>
-  <New>DocumentLibraryForm</New>
-</FormTemplates>
-</file>
-
-<file path=customXml/item3.xml><?xml version="1.0" encoding="utf-8"?>
-<p:properties xmlns:p="http://schemas.microsoft.com/office/2006/metadata/properties" xmlns:xsi="http://www.w3.org/2001/XMLSchema-instance">
-  <documentManagement>
-    <c5aebc35b3e840e5912c276ffe755dcf xmlns="d95a5b16-1b8d-4c7c-9ebf-89c0983b6970">
-      <Terms xmlns="http://schemas.microsoft.com/office/infopath/2007/PartnerControls"/>
-    </c5aebc35b3e840e5912c276ffe755dcf>
-    <c79d12643ffc4d60ab657aaa1718cc32 xmlns="d95a5b16-1b8d-4c7c-9ebf-89c0983b6970">
-      <Terms xmlns="http://schemas.microsoft.com/office/infopath/2007/PartnerControls">
-        <TermInfo xmlns="http://schemas.microsoft.com/office/infopath/2007/PartnerControls">
-          <TermName xmlns="http://schemas.microsoft.com/office/infopath/2007/PartnerControls">Global</TermName>
-          <TermId xmlns="http://schemas.microsoft.com/office/infopath/2007/PartnerControls">43ac7042-3752-4f1b-8a93-43b36e65d3e5</TermId>
-        </TermInfo>
-      </Terms>
-    </c79d12643ffc4d60ab657aaa1718cc32>
-    <p43f7bb208e443c9b50eb304fe6606a3 xmlns="d95a5b16-1b8d-4c7c-9ebf-89c0983b6970">
-      <Terms xmlns="http://schemas.microsoft.com/office/infopath/2007/PartnerControls"/>
-    </p43f7bb208e443c9b50eb304fe6606a3>
-    <TaxCatchAll xmlns="d95a5b16-1b8d-4c7c-9ebf-89c0983b6970">
-      <Value>260</Value>
-    </TaxCatchAll>
-    <h4c66fbf292e4125b0e390af25f11c04 xmlns="d95a5b16-1b8d-4c7c-9ebf-89c0983b6970">
-      <Terms xmlns="http://schemas.microsoft.com/office/infopath/2007/PartnerControls"/>
-    </h4c66fbf292e4125b0e390af25f11c04>
-    <eafb632c3f5c40ba98242be6bbd6bb17 xmlns="d95a5b16-1b8d-4c7c-9ebf-89c0983b6970">
-      <Terms xmlns="http://schemas.microsoft.com/office/infopath/2007/PartnerControls"/>
-    </eafb632c3f5c40ba98242be6bbd6bb17>
-    <Creator xmlns="d95a5b16-1b8d-4c7c-9ebf-89c0983b6970" xsi:nil="true"/>
-    <Language xmlns="http://schemas.microsoft.com/sharepoint/v3">EN</Language>
-    <CSMeta2010Field xmlns="http://schemas.microsoft.com/sharepoint/v3">b976f27d-4168-4ec3-9a20-c9b3ef3f986f;2017-08-30 20:22:02;AUTOCLASSIFIED;Business theme:2017-08-30 20:22:02|True||AUTOCLASSIFIED|2017-08-30 20:22:02|UNDEFINED|943f7bb2-08e4-43c9-b50e-b304fe6606a3;Organization:2017-08-30 20:22:02|False||AUTOCLASSIFIED|2017-08-30 20:22:02|UNDEFINED|c79d1264-3ffc-4d60-ab65-7aaa1718cc32;Sector:2017-08-30 20:22:02|True||AUTOCLASSIFIED|2017-08-30 20:22:02|UNDEFINED|c5aebc35-b3e8-40e5-912c-276ffe755dcf;Proposition:2017-08-30 20:22:02|True||AUTOCLASSIFIED|2017-08-30 20:22:02|UNDEFINED|14c66fbf-292e-4125-b0e3-90af25f11c04;Service line:2017-08-30 20:22:02|True||AUTOCLASSIFIED|2017-08-30 20:22:02|UNDEFINED|eafb632c-3f5c-40ba-9824-2be6bbd6bb17;Business Practice:2017-08-30 20:22:02|True||AUTOCLASSIFIED|2017-08-30 20:22:02|UNDEFINED|b0f7c43c-b32a-4bb9-9696-cc0157e407bc;False</CSMeta2010Field>
-    <b0f7c43cb32a4bb99696cc0157e407bc xmlns="d95a5b16-1b8d-4c7c-9ebf-89c0983b6970">
-      <Terms xmlns="http://schemas.microsoft.com/office/infopath/2007/PartnerControls"/>
-    </b0f7c43cb32a4bb99696cc0157e407bc>
-    <Abstract xmlns="d95a5b16-1b8d-4c7c-9ebf-89c0983b6970">CGI-beet-option_widescreen_EN</Abstract>
-    <External_x0020_Use xmlns="d95a5b16-1b8d-4c7c-9ebf-89c0983b6970">No</External_x0020_Use>
-    <Owner_x0020_Organisation xmlns="d95a5b16-1b8d-4c7c-9ebf-89c0983b6970">Group</Owner_x0020_Organisation>
-    <BS_x0020_Document_x0020_Sub_x0020_Type xmlns="d95a5b16-1b8d-4c7c-9ebf-89c0983b6970">Pro Forma</BS_x0020_Document_x0020_Sub_x0020_Type>
-    <Market xmlns="d95a5b16-1b8d-4c7c-9ebf-89c0983b6970"/>
-    <TaxKeywordTaxHTField xmlns="d95a5b16-1b8d-4c7c-9ebf-89c0983b6970">
-      <Terms xmlns="http://schemas.microsoft.com/office/infopath/2007/PartnerControls"/>
-    </TaxKeywordTaxHTField>
-    <Best_x0020_Before_x0020_Date xmlns="d95a5b16-1b8d-4c7c-9ebf-89c0983b6970">2020-09-28T23:00:00+00:00</Best_x0020_Before_x0020_Date>
-    <Published_x0020_By xmlns="d95a5b16-1b8d-4c7c-9ebf-89c0983b6970">
-      <UserInfo>
-        <DisplayName>Stiller, Regina C</DisplayName>
-        <AccountId>55167</AccountId>
-        <AccountType/>
-      </UserInfo>
-    </Published_x0020_By>
-    <Publication_x0020_Date xmlns="d95a5b16-1b8d-4c7c-9ebf-89c0983b6970">2015-09-28T23:00:00+00:00</Publication_x0020_Date>
-    <Geographic_x0020_Region xmlns="d95a5b16-1b8d-4c7c-9ebf-89c0983b6970"/>
-  </documentManagement>
-</p:properties>
 </file>
 
 <file path=customXml/item4.xml><?xml version="1.0" encoding="utf-8"?>
@@ -17001,9 +17008,18 @@
 </file>
 
 <file path=customXml/itemProps1.xml><?xml version="1.0" encoding="utf-8"?>
-<ds:datastoreItem xmlns:ds="http://schemas.openxmlformats.org/officeDocument/2006/customXml" ds:itemID="{B93A927E-1901-4552-BDF7-8B23BCBF48CA}">
+<ds:datastoreItem xmlns:ds="http://schemas.openxmlformats.org/officeDocument/2006/customXml" ds:itemID="{2F4C4F6A-F6A5-45C8-BAAA-52FB70E387C7}">
   <ds:schemaRefs>
-    <ds:schemaRef ds:uri="http://schemas.microsoft.com/sharepoint/events"/>
+    <ds:schemaRef ds:uri="http://schemas.microsoft.com/office/2006/documentManagement/types"/>
+    <ds:schemaRef ds:uri="http://purl.org/dc/elements/1.1/"/>
+    <ds:schemaRef ds:uri="http://purl.org/dc/terms/"/>
+    <ds:schemaRef ds:uri="http://schemas.microsoft.com/office/infopath/2007/PartnerControls"/>
+    <ds:schemaRef ds:uri="http://www.w3.org/XML/1998/namespace"/>
+    <ds:schemaRef ds:uri="d95a5b16-1b8d-4c7c-9ebf-89c0983b6970"/>
+    <ds:schemaRef ds:uri="http://schemas.openxmlformats.org/package/2006/metadata/core-properties"/>
+    <ds:schemaRef ds:uri="http://schemas.microsoft.com/sharepoint/v3"/>
+    <ds:schemaRef ds:uri="http://schemas.microsoft.com/office/2006/metadata/properties"/>
+    <ds:schemaRef ds:uri="http://purl.org/dc/dcmitype/"/>
   </ds:schemaRefs>
 </ds:datastoreItem>
 </file>
@@ -17017,18 +17033,9 @@
 </file>
 
 <file path=customXml/itemProps3.xml><?xml version="1.0" encoding="utf-8"?>
-<ds:datastoreItem xmlns:ds="http://schemas.openxmlformats.org/officeDocument/2006/customXml" ds:itemID="{2F4C4F6A-F6A5-45C8-BAAA-52FB70E387C7}">
+<ds:datastoreItem xmlns:ds="http://schemas.openxmlformats.org/officeDocument/2006/customXml" ds:itemID="{B93A927E-1901-4552-BDF7-8B23BCBF48CA}">
   <ds:schemaRefs>
-    <ds:schemaRef ds:uri="http://schemas.microsoft.com/office/2006/documentManagement/types"/>
-    <ds:schemaRef ds:uri="http://purl.org/dc/elements/1.1/"/>
-    <ds:schemaRef ds:uri="http://purl.org/dc/terms/"/>
-    <ds:schemaRef ds:uri="http://schemas.microsoft.com/office/infopath/2007/PartnerControls"/>
-    <ds:schemaRef ds:uri="http://www.w3.org/XML/1998/namespace"/>
-    <ds:schemaRef ds:uri="d95a5b16-1b8d-4c7c-9ebf-89c0983b6970"/>
-    <ds:schemaRef ds:uri="http://schemas.openxmlformats.org/package/2006/metadata/core-properties"/>
-    <ds:schemaRef ds:uri="http://schemas.microsoft.com/sharepoint/v3"/>
-    <ds:schemaRef ds:uri="http://schemas.microsoft.com/office/2006/metadata/properties"/>
-    <ds:schemaRef ds:uri="http://purl.org/dc/dcmitype/"/>
+    <ds:schemaRef ds:uri="http://schemas.microsoft.com/sharepoint/events"/>
   </ds:schemaRefs>
 </ds:datastoreItem>
 </file>

</xml_diff>